<commit_message>
Updated SOC6100 journal article critique presentation
</commit_message>
<xml_diff>
--- a/Presentations/Presentation01/AsiriHouseTownes_SOC6100_JournalArticleCritique_v00.pptx
+++ b/Presentations/Presentation01/AsiriHouseTownes_SOC6100_JournalArticleCritique_v00.pptx
@@ -2124,8 +2124,8 @@
     <dgm:cxn modelId="{C08DB0C1-AAAF-4E10-8104-4F5496928401}" type="presOf" srcId="{EF2FB0FF-718F-4AC3-B263-14C79AAECB9D}" destId="{8BB89208-568D-4CB0-BB01-1D5CE9E2C6EE}" srcOrd="0" destOrd="0" presId="urn:microsoft.com/office/officeart/2005/8/layout/vList2"/>
     <dgm:cxn modelId="{94545DFE-9D87-44D7-B09F-172240A7DFD6}" srcId="{D19434F5-8BA7-42A5-B06E-2A622BED50C2}" destId="{5E378D90-3C64-4F54-9EAF-339B3B633069}" srcOrd="3" destOrd="0" parTransId="{712EDBB5-B940-432F-9757-B048E08F8546}" sibTransId="{C0054E9D-D1A6-4E64-A302-AD66D9DD0AA0}"/>
     <dgm:cxn modelId="{A9F6E0FC-ABF1-4B15-8D87-0D429A78CC20}" type="presOf" srcId="{6CD38410-63FE-49E8-A15F-43113B579FC4}" destId="{599AE2E8-45C3-4D8A-9228-B6EB827C01EB}" srcOrd="0" destOrd="0" presId="urn:microsoft.com/office/officeart/2005/8/layout/vList2"/>
+    <dgm:cxn modelId="{19802695-09B6-4A61-A02B-2946680F8901}" srcId="{B8C5F0A9-8B0B-4F25-A41F-C13262A97A82}" destId="{1C9ABC7F-5385-42E3-8133-66E6895E84BA}" srcOrd="0" destOrd="0" parTransId="{6F8535C0-9F19-4BAF-A5B1-04193E3FD565}" sibTransId="{C68F268B-AD5F-46C5-854B-5C0215A6935F}"/>
     <dgm:cxn modelId="{653864B4-F740-428D-BAC3-ECD6B652EC67}" type="presOf" srcId="{B8C5F0A9-8B0B-4F25-A41F-C13262A97A82}" destId="{BB8AE1D7-93E2-4F7D-95A0-24893BD88B49}" srcOrd="0" destOrd="0" presId="urn:microsoft.com/office/officeart/2005/8/layout/vList2"/>
-    <dgm:cxn modelId="{19802695-09B6-4A61-A02B-2946680F8901}" srcId="{B8C5F0A9-8B0B-4F25-A41F-C13262A97A82}" destId="{1C9ABC7F-5385-42E3-8133-66E6895E84BA}" srcOrd="0" destOrd="0" parTransId="{6F8535C0-9F19-4BAF-A5B1-04193E3FD565}" sibTransId="{C68F268B-AD5F-46C5-854B-5C0215A6935F}"/>
     <dgm:cxn modelId="{55496AFF-0341-4E33-B3BD-4A318C027C4F}" srcId="{D19434F5-8BA7-42A5-B06E-2A622BED50C2}" destId="{6CD38410-63FE-49E8-A15F-43113B579FC4}" srcOrd="2" destOrd="0" parTransId="{1B449093-E713-434B-9FEF-C48394D097DD}" sibTransId="{AB28A93F-DD8D-4798-A5EA-7B51DD175AAC}"/>
     <dgm:cxn modelId="{50CA1C2B-40BB-42D2-BDDA-117086E5C741}" type="presParOf" srcId="{E32AB43C-F7CF-45AC-88A2-FE48D30B914D}" destId="{8BB89208-568D-4CB0-BB01-1D5CE9E2C6EE}" srcOrd="0" destOrd="0" presId="urn:microsoft.com/office/officeart/2005/8/layout/vList2"/>
     <dgm:cxn modelId="{180E2E21-D07C-44CE-A452-5C6FC833A887}" type="presParOf" srcId="{E32AB43C-F7CF-45AC-88A2-FE48D30B914D}" destId="{0CD346E0-8734-438E-982D-85C38298B913}" srcOrd="1" destOrd="0" presId="urn:microsoft.com/office/officeart/2005/8/layout/vList2"/>
@@ -2392,6 +2392,13 @@
         </dgm:presLayoutVars>
       </dgm:prSet>
       <dgm:spPr/>
+      <dgm:t>
+        <a:bodyPr/>
+        <a:lstStyle/>
+        <a:p>
+          <a:endParaRPr lang="en-US"/>
+        </a:p>
+      </dgm:t>
     </dgm:pt>
     <dgm:pt modelId="{3809D590-D505-4609-9449-8C7CE26BBB73}" type="pres">
       <dgm:prSet presAssocID="{9F9ACDB7-69F3-42B4-85D1-4C285161159B}" presName="centerShape" presStyleLbl="node0" presStyleIdx="0" presStyleCnt="1"/>
@@ -2407,6 +2414,13 @@
     <dgm:pt modelId="{7DB67E7E-02A5-470D-B3C9-6D50F5061F50}" type="pres">
       <dgm:prSet presAssocID="{34A57799-5744-4670-8677-8285D770B83B}" presName="parTrans" presStyleLbl="bgSibTrans2D1" presStyleIdx="0" presStyleCnt="5"/>
       <dgm:spPr/>
+      <dgm:t>
+        <a:bodyPr/>
+        <a:lstStyle/>
+        <a:p>
+          <a:endParaRPr lang="en-US"/>
+        </a:p>
+      </dgm:t>
     </dgm:pt>
     <dgm:pt modelId="{475CE39B-1B99-4666-8EDA-F8CB494B907E}" type="pres">
       <dgm:prSet presAssocID="{B26262CB-874E-4F16-B449-806DCFD6FF59}" presName="node" presStyleLbl="node1" presStyleIdx="0" presStyleCnt="5">
@@ -2415,10 +2429,24 @@
         </dgm:presLayoutVars>
       </dgm:prSet>
       <dgm:spPr/>
+      <dgm:t>
+        <a:bodyPr/>
+        <a:lstStyle/>
+        <a:p>
+          <a:endParaRPr lang="en-US"/>
+        </a:p>
+      </dgm:t>
     </dgm:pt>
     <dgm:pt modelId="{E7B6E3C1-9173-4B48-9836-966CDCBB5D3D}" type="pres">
       <dgm:prSet presAssocID="{389063E5-AB4B-41A1-9F2B-66A30B53A059}" presName="parTrans" presStyleLbl="bgSibTrans2D1" presStyleIdx="1" presStyleCnt="5"/>
       <dgm:spPr/>
+      <dgm:t>
+        <a:bodyPr/>
+        <a:lstStyle/>
+        <a:p>
+          <a:endParaRPr lang="en-US"/>
+        </a:p>
+      </dgm:t>
     </dgm:pt>
     <dgm:pt modelId="{FB8BD749-76FC-4B88-BA7B-8ACF9A8A8328}" type="pres">
       <dgm:prSet presAssocID="{C6620DD8-95A5-4BF3-87F5-F77A6A7047F9}" presName="node" presStyleLbl="node1" presStyleIdx="1" presStyleCnt="5">
@@ -2435,12 +2463,19 @@
         </a:p>
       </dgm:t>
     </dgm:pt>
-    <dgm:pt modelId="{8D8ECBD2-0A32-4224-A57A-330F54581E97}" type="pres">
-      <dgm:prSet presAssocID="{2424488D-5A6C-43FE-95B4-99174C4E826C}" presName="parTrans" presStyleLbl="bgSibTrans2D1" presStyleIdx="2" presStyleCnt="5"/>
+    <dgm:pt modelId="{03919DC9-F0C3-4069-85B9-CC4858C63CBF}" type="pres">
+      <dgm:prSet presAssocID="{2997880D-D57B-416E-A341-D8DB7437267B}" presName="parTrans" presStyleLbl="bgSibTrans2D1" presStyleIdx="2" presStyleCnt="5"/>
       <dgm:spPr/>
+      <dgm:t>
+        <a:bodyPr/>
+        <a:lstStyle/>
+        <a:p>
+          <a:endParaRPr lang="en-US"/>
+        </a:p>
+      </dgm:t>
     </dgm:pt>
-    <dgm:pt modelId="{2436356F-AAE9-4DEE-876B-C3572B7F1160}" type="pres">
-      <dgm:prSet presAssocID="{BB4ABCC9-A1D7-442E-AF24-14FA35846729}" presName="node" presStyleLbl="node1" presStyleIdx="2" presStyleCnt="5">
+    <dgm:pt modelId="{D4C39038-227F-471A-BACA-6905B12B6FE8}" type="pres">
+      <dgm:prSet presAssocID="{6698E22C-B497-4E1A-92EE-F348C55196C6}" presName="node" presStyleLbl="node1" presStyleIdx="2" presStyleCnt="5">
         <dgm:presLayoutVars>
           <dgm:bulletEnabled val="1"/>
         </dgm:presLayoutVars>
@@ -2454,12 +2489,19 @@
         </a:p>
       </dgm:t>
     </dgm:pt>
-    <dgm:pt modelId="{03919DC9-F0C3-4069-85B9-CC4858C63CBF}" type="pres">
-      <dgm:prSet presAssocID="{2997880D-D57B-416E-A341-D8DB7437267B}" presName="parTrans" presStyleLbl="bgSibTrans2D1" presStyleIdx="3" presStyleCnt="5"/>
+    <dgm:pt modelId="{8D8ECBD2-0A32-4224-A57A-330F54581E97}" type="pres">
+      <dgm:prSet presAssocID="{2424488D-5A6C-43FE-95B4-99174C4E826C}" presName="parTrans" presStyleLbl="bgSibTrans2D1" presStyleIdx="3" presStyleCnt="5"/>
       <dgm:spPr/>
+      <dgm:t>
+        <a:bodyPr/>
+        <a:lstStyle/>
+        <a:p>
+          <a:endParaRPr lang="en-US"/>
+        </a:p>
+      </dgm:t>
     </dgm:pt>
-    <dgm:pt modelId="{D4C39038-227F-471A-BACA-6905B12B6FE8}" type="pres">
-      <dgm:prSet presAssocID="{6698E22C-B497-4E1A-92EE-F348C55196C6}" presName="node" presStyleLbl="node1" presStyleIdx="3" presStyleCnt="5">
+    <dgm:pt modelId="{2436356F-AAE9-4DEE-876B-C3572B7F1160}" type="pres">
+      <dgm:prSet presAssocID="{BB4ABCC9-A1D7-442E-AF24-14FA35846729}" presName="node" presStyleLbl="node1" presStyleIdx="3" presStyleCnt="5">
         <dgm:presLayoutVars>
           <dgm:bulletEnabled val="1"/>
         </dgm:presLayoutVars>
@@ -2476,6 +2518,13 @@
     <dgm:pt modelId="{CCB92EE8-4D92-4517-980A-59D31132CB69}" type="pres">
       <dgm:prSet presAssocID="{97691E80-E1B0-4E78-9C63-2FD4A02FD626}" presName="parTrans" presStyleLbl="bgSibTrans2D1" presStyleIdx="4" presStyleCnt="5"/>
       <dgm:spPr/>
+      <dgm:t>
+        <a:bodyPr/>
+        <a:lstStyle/>
+        <a:p>
+          <a:endParaRPr lang="en-US"/>
+        </a:p>
+      </dgm:t>
     </dgm:pt>
     <dgm:pt modelId="{B53A010F-0ACE-4722-BD08-564C2143C5D3}" type="pres">
       <dgm:prSet presAssocID="{C615DDC0-2A0A-417E-A3FF-A70C6FA72124}" presName="node" presStyleLbl="node1" presStyleIdx="4" presStyleCnt="5">
@@ -2484,44 +2533,51 @@
         </dgm:presLayoutVars>
       </dgm:prSet>
       <dgm:spPr/>
+      <dgm:t>
+        <a:bodyPr/>
+        <a:lstStyle/>
+        <a:p>
+          <a:endParaRPr lang="en-US"/>
+        </a:p>
+      </dgm:t>
     </dgm:pt>
   </dgm:ptLst>
   <dgm:cxnLst>
-    <dgm:cxn modelId="{C133B79F-CC4A-4A70-A4CF-0BCF65E39629}" type="presOf" srcId="{34A57799-5744-4670-8677-8285D770B83B}" destId="{7DB67E7E-02A5-470D-B3C9-6D50F5061F50}" srcOrd="0" destOrd="0" presId="urn:microsoft.com/office/officeart/2005/8/layout/radial4"/>
+    <dgm:cxn modelId="{FA7D0459-3BA7-4120-ACA0-3FE2D8B4B229}" type="presOf" srcId="{C6620DD8-95A5-4BF3-87F5-F77A6A7047F9}" destId="{FB8BD749-76FC-4B88-BA7B-8ACF9A8A8328}" srcOrd="0" destOrd="0" presId="urn:microsoft.com/office/officeart/2005/8/layout/radial4"/>
     <dgm:cxn modelId="{89D162F4-AF7A-43D6-B9BE-983BA6978372}" srcId="{9F9ACDB7-69F3-42B4-85D1-4C285161159B}" destId="{B26262CB-874E-4F16-B449-806DCFD6FF59}" srcOrd="0" destOrd="0" parTransId="{34A57799-5744-4670-8677-8285D770B83B}" sibTransId="{750C1D42-3883-4126-894D-DAB2FD6AACED}"/>
+    <dgm:cxn modelId="{6622C808-25C2-48A7-AB28-65061B5C806A}" type="presOf" srcId="{6698E22C-B497-4E1A-92EE-F348C55196C6}" destId="{D4C39038-227F-471A-BACA-6905B12B6FE8}" srcOrd="0" destOrd="0" presId="urn:microsoft.com/office/officeart/2005/8/layout/radial4"/>
+    <dgm:cxn modelId="{6738320F-4006-4861-A58A-73308B4C3281}" type="presOf" srcId="{2997880D-D57B-416E-A341-D8DB7437267B}" destId="{03919DC9-F0C3-4069-85B9-CC4858C63CBF}" srcOrd="0" destOrd="0" presId="urn:microsoft.com/office/officeart/2005/8/layout/radial4"/>
     <dgm:cxn modelId="{9D47C67D-EE3E-4D8B-BFF0-A00DBFC9BDA2}" srcId="{9F9ACDB7-69F3-42B4-85D1-4C285161159B}" destId="{C6620DD8-95A5-4BF3-87F5-F77A6A7047F9}" srcOrd="1" destOrd="0" parTransId="{389063E5-AB4B-41A1-9F2B-66A30B53A059}" sibTransId="{905C9BA8-2D76-4A5A-8E02-ACE254687A47}"/>
-    <dgm:cxn modelId="{458E7ABF-316D-47DF-9AFE-B2DC8D267EE8}" type="presOf" srcId="{BB4ABCC9-A1D7-442E-AF24-14FA35846729}" destId="{2436356F-AAE9-4DEE-876B-C3572B7F1160}" srcOrd="0" destOrd="0" presId="urn:microsoft.com/office/officeart/2005/8/layout/radial4"/>
-    <dgm:cxn modelId="{F8F72025-1BAB-4C5F-A3E6-E90FAAAA6340}" type="presOf" srcId="{9F9ACDB7-69F3-42B4-85D1-4C285161159B}" destId="{3809D590-D505-4609-9449-8C7CE26BBB73}" srcOrd="0" destOrd="0" presId="urn:microsoft.com/office/officeart/2005/8/layout/radial4"/>
-    <dgm:cxn modelId="{2A16684E-827E-4A6D-AC00-870322C4166C}" type="presOf" srcId="{2424488D-5A6C-43FE-95B4-99174C4E826C}" destId="{8D8ECBD2-0A32-4224-A57A-330F54581E97}" srcOrd="0" destOrd="0" presId="urn:microsoft.com/office/officeart/2005/8/layout/radial4"/>
-    <dgm:cxn modelId="{4B616274-3EC3-4F75-809A-A183E4C735AF}" type="presOf" srcId="{C6620DD8-95A5-4BF3-87F5-F77A6A7047F9}" destId="{FB8BD749-76FC-4B88-BA7B-8ACF9A8A8328}" srcOrd="0" destOrd="0" presId="urn:microsoft.com/office/officeart/2005/8/layout/radial4"/>
+    <dgm:cxn modelId="{88903395-779E-4EEF-9C92-A3D798077FC8}" type="presOf" srcId="{34A57799-5744-4670-8677-8285D770B83B}" destId="{7DB67E7E-02A5-470D-B3C9-6D50F5061F50}" srcOrd="0" destOrd="0" presId="urn:microsoft.com/office/officeart/2005/8/layout/radial4"/>
+    <dgm:cxn modelId="{8ECCB935-24DA-43D4-99BD-D4DB6BFE429A}" type="presOf" srcId="{389063E5-AB4B-41A1-9F2B-66A30B53A059}" destId="{E7B6E3C1-9173-4B48-9836-966CDCBB5D3D}" srcOrd="0" destOrd="0" presId="urn:microsoft.com/office/officeart/2005/8/layout/radial4"/>
     <dgm:cxn modelId="{B9F391A3-6311-40EA-BEB2-A2FF2B7BC0E4}" type="presOf" srcId="{0EBDF769-FC98-4873-9EE3-811DE55CE62C}" destId="{B66289B8-5DD2-4F87-AEB5-572BEEE6580F}" srcOrd="0" destOrd="0" presId="urn:microsoft.com/office/officeart/2005/8/layout/radial4"/>
-    <dgm:cxn modelId="{E5EA0ECB-156A-48DB-8765-CFC4918086AD}" type="presOf" srcId="{2997880D-D57B-416E-A341-D8DB7437267B}" destId="{03919DC9-F0C3-4069-85B9-CC4858C63CBF}" srcOrd="0" destOrd="0" presId="urn:microsoft.com/office/officeart/2005/8/layout/radial4"/>
-    <dgm:cxn modelId="{5316365D-5A11-4916-AD21-21138850C97D}" type="presOf" srcId="{C615DDC0-2A0A-417E-A3FF-A70C6FA72124}" destId="{B53A010F-0ACE-4722-BD08-564C2143C5D3}" srcOrd="0" destOrd="0" presId="urn:microsoft.com/office/officeart/2005/8/layout/radial4"/>
-    <dgm:cxn modelId="{7C06ACA4-F01F-42BB-A0D2-364C5032BA61}" type="presOf" srcId="{97691E80-E1B0-4E78-9C63-2FD4A02FD626}" destId="{CCB92EE8-4D92-4517-980A-59D31132CB69}" srcOrd="0" destOrd="0" presId="urn:microsoft.com/office/officeart/2005/8/layout/radial4"/>
-    <dgm:cxn modelId="{DDC142F5-BD15-4CC2-BEA0-AB2AFBC92EFD}" type="presOf" srcId="{6698E22C-B497-4E1A-92EE-F348C55196C6}" destId="{D4C39038-227F-471A-BACA-6905B12B6FE8}" srcOrd="0" destOrd="0" presId="urn:microsoft.com/office/officeart/2005/8/layout/radial4"/>
+    <dgm:cxn modelId="{9D7EA0B7-C7D8-4FD8-AA82-CDCD35729D85}" type="presOf" srcId="{BB4ABCC9-A1D7-442E-AF24-14FA35846729}" destId="{2436356F-AAE9-4DEE-876B-C3572B7F1160}" srcOrd="0" destOrd="0" presId="urn:microsoft.com/office/officeart/2005/8/layout/radial4"/>
     <dgm:cxn modelId="{2C55529B-2908-4F00-AE58-8D528B5A7D0D}" srcId="{0EBDF769-FC98-4873-9EE3-811DE55CE62C}" destId="{9F9ACDB7-69F3-42B4-85D1-4C285161159B}" srcOrd="0" destOrd="0" parTransId="{B96C4A01-D230-4CC0-A34B-6242CC16D175}" sibTransId="{78C88513-AC7E-4624-8DD5-D5005C609385}"/>
-    <dgm:cxn modelId="{DCCBE535-7C86-4C63-A6E9-FD7B98B10B5D}" type="presOf" srcId="{389063E5-AB4B-41A1-9F2B-66A30B53A059}" destId="{E7B6E3C1-9173-4B48-9836-966CDCBB5D3D}" srcOrd="0" destOrd="0" presId="urn:microsoft.com/office/officeart/2005/8/layout/radial4"/>
     <dgm:cxn modelId="{6942F86B-6C31-4512-A1FB-B227CDCFA95B}" srcId="{9F9ACDB7-69F3-42B4-85D1-4C285161159B}" destId="{C615DDC0-2A0A-417E-A3FF-A70C6FA72124}" srcOrd="4" destOrd="0" parTransId="{97691E80-E1B0-4E78-9C63-2FD4A02FD626}" sibTransId="{29D85AA8-AB6A-46BB-B769-4EEDDF675C86}"/>
-    <dgm:cxn modelId="{23D377E0-CB5D-4A51-8E30-B841166CCCEA}" srcId="{9F9ACDB7-69F3-42B4-85D1-4C285161159B}" destId="{BB4ABCC9-A1D7-442E-AF24-14FA35846729}" srcOrd="2" destOrd="0" parTransId="{2424488D-5A6C-43FE-95B4-99174C4E826C}" sibTransId="{B2B47137-4859-42BB-A07B-C632EBD89853}"/>
-    <dgm:cxn modelId="{5EB7A352-BCF1-4EB4-80DF-7B69ADF1E2C2}" srcId="{9F9ACDB7-69F3-42B4-85D1-4C285161159B}" destId="{6698E22C-B497-4E1A-92EE-F348C55196C6}" srcOrd="3" destOrd="0" parTransId="{2997880D-D57B-416E-A341-D8DB7437267B}" sibTransId="{6384C8B8-36CE-4B52-AD1A-1FFFD78FAD79}"/>
-    <dgm:cxn modelId="{A8A115DC-2688-454A-AD33-1711CA3070B7}" type="presOf" srcId="{B26262CB-874E-4F16-B449-806DCFD6FF59}" destId="{475CE39B-1B99-4666-8EDA-F8CB494B907E}" srcOrd="0" destOrd="0" presId="urn:microsoft.com/office/officeart/2005/8/layout/radial4"/>
-    <dgm:cxn modelId="{EB25BB5B-86A3-48C3-AC88-51DE396F8640}" type="presParOf" srcId="{B66289B8-5DD2-4F87-AEB5-572BEEE6580F}" destId="{3809D590-D505-4609-9449-8C7CE26BBB73}" srcOrd="0" destOrd="0" presId="urn:microsoft.com/office/officeart/2005/8/layout/radial4"/>
-    <dgm:cxn modelId="{B124D512-3A31-4063-B4E8-E22765491A50}" type="presParOf" srcId="{B66289B8-5DD2-4F87-AEB5-572BEEE6580F}" destId="{7DB67E7E-02A5-470D-B3C9-6D50F5061F50}" srcOrd="1" destOrd="0" presId="urn:microsoft.com/office/officeart/2005/8/layout/radial4"/>
-    <dgm:cxn modelId="{B5315568-E8BC-4F8A-BEF5-C38249678888}" type="presParOf" srcId="{B66289B8-5DD2-4F87-AEB5-572BEEE6580F}" destId="{475CE39B-1B99-4666-8EDA-F8CB494B907E}" srcOrd="2" destOrd="0" presId="urn:microsoft.com/office/officeart/2005/8/layout/radial4"/>
-    <dgm:cxn modelId="{64382B0E-46AD-4421-85D2-9B801365DDF6}" type="presParOf" srcId="{B66289B8-5DD2-4F87-AEB5-572BEEE6580F}" destId="{E7B6E3C1-9173-4B48-9836-966CDCBB5D3D}" srcOrd="3" destOrd="0" presId="urn:microsoft.com/office/officeart/2005/8/layout/radial4"/>
-    <dgm:cxn modelId="{C1B652EC-6ACA-41CD-A7FF-52DF1785B358}" type="presParOf" srcId="{B66289B8-5DD2-4F87-AEB5-572BEEE6580F}" destId="{FB8BD749-76FC-4B88-BA7B-8ACF9A8A8328}" srcOrd="4" destOrd="0" presId="urn:microsoft.com/office/officeart/2005/8/layout/radial4"/>
-    <dgm:cxn modelId="{60296E99-76A6-4066-AB8A-0619B5DEA48A}" type="presParOf" srcId="{B66289B8-5DD2-4F87-AEB5-572BEEE6580F}" destId="{8D8ECBD2-0A32-4224-A57A-330F54581E97}" srcOrd="5" destOrd="0" presId="urn:microsoft.com/office/officeart/2005/8/layout/radial4"/>
-    <dgm:cxn modelId="{F9A38FC9-2EAE-4D91-A904-46F7494AAF0F}" type="presParOf" srcId="{B66289B8-5DD2-4F87-AEB5-572BEEE6580F}" destId="{2436356F-AAE9-4DEE-876B-C3572B7F1160}" srcOrd="6" destOrd="0" presId="urn:microsoft.com/office/officeart/2005/8/layout/radial4"/>
-    <dgm:cxn modelId="{0039048E-22E7-4F5E-8F52-7489DBFC079C}" type="presParOf" srcId="{B66289B8-5DD2-4F87-AEB5-572BEEE6580F}" destId="{03919DC9-F0C3-4069-85B9-CC4858C63CBF}" srcOrd="7" destOrd="0" presId="urn:microsoft.com/office/officeart/2005/8/layout/radial4"/>
-    <dgm:cxn modelId="{4C7324AA-42EC-489F-B972-BEC496723971}" type="presParOf" srcId="{B66289B8-5DD2-4F87-AEB5-572BEEE6580F}" destId="{D4C39038-227F-471A-BACA-6905B12B6FE8}" srcOrd="8" destOrd="0" presId="urn:microsoft.com/office/officeart/2005/8/layout/radial4"/>
-    <dgm:cxn modelId="{006BDB90-5ED3-411D-A16F-9DFEBC6E526A}" type="presParOf" srcId="{B66289B8-5DD2-4F87-AEB5-572BEEE6580F}" destId="{CCB92EE8-4D92-4517-980A-59D31132CB69}" srcOrd="9" destOrd="0" presId="urn:microsoft.com/office/officeart/2005/8/layout/radial4"/>
-    <dgm:cxn modelId="{BC4A63A4-4409-4EEE-B0EE-6D772420E722}" type="presParOf" srcId="{B66289B8-5DD2-4F87-AEB5-572BEEE6580F}" destId="{B53A010F-0ACE-4722-BD08-564C2143C5D3}" srcOrd="10" destOrd="0" presId="urn:microsoft.com/office/officeart/2005/8/layout/radial4"/>
+    <dgm:cxn modelId="{C82AE920-E5A1-4073-B221-523BC05E2ACF}" type="presOf" srcId="{9F9ACDB7-69F3-42B4-85D1-4C285161159B}" destId="{3809D590-D505-4609-9449-8C7CE26BBB73}" srcOrd="0" destOrd="0" presId="urn:microsoft.com/office/officeart/2005/8/layout/radial4"/>
+    <dgm:cxn modelId="{2EA6C5A8-89E0-46C3-B237-9CBF48194725}" type="presOf" srcId="{2424488D-5A6C-43FE-95B4-99174C4E826C}" destId="{8D8ECBD2-0A32-4224-A57A-330F54581E97}" srcOrd="0" destOrd="0" presId="urn:microsoft.com/office/officeart/2005/8/layout/radial4"/>
+    <dgm:cxn modelId="{23D377E0-CB5D-4A51-8E30-B841166CCCEA}" srcId="{9F9ACDB7-69F3-42B4-85D1-4C285161159B}" destId="{BB4ABCC9-A1D7-442E-AF24-14FA35846729}" srcOrd="3" destOrd="0" parTransId="{2424488D-5A6C-43FE-95B4-99174C4E826C}" sibTransId="{B2B47137-4859-42BB-A07B-C632EBD89853}"/>
+    <dgm:cxn modelId="{0C62C5B0-F33A-4376-AB1E-859669A1E08B}" type="presOf" srcId="{B26262CB-874E-4F16-B449-806DCFD6FF59}" destId="{475CE39B-1B99-4666-8EDA-F8CB494B907E}" srcOrd="0" destOrd="0" presId="urn:microsoft.com/office/officeart/2005/8/layout/radial4"/>
+    <dgm:cxn modelId="{5C434B8A-0F52-4500-AFE2-F5C38836F6E2}" type="presOf" srcId="{C615DDC0-2A0A-417E-A3FF-A70C6FA72124}" destId="{B53A010F-0ACE-4722-BD08-564C2143C5D3}" srcOrd="0" destOrd="0" presId="urn:microsoft.com/office/officeart/2005/8/layout/radial4"/>
+    <dgm:cxn modelId="{5EB7A352-BCF1-4EB4-80DF-7B69ADF1E2C2}" srcId="{9F9ACDB7-69F3-42B4-85D1-4C285161159B}" destId="{6698E22C-B497-4E1A-92EE-F348C55196C6}" srcOrd="2" destOrd="0" parTransId="{2997880D-D57B-416E-A341-D8DB7437267B}" sibTransId="{6384C8B8-36CE-4B52-AD1A-1FFFD78FAD79}"/>
+    <dgm:cxn modelId="{056FD566-21B1-4663-8DFB-863B43036D50}" type="presOf" srcId="{97691E80-E1B0-4E78-9C63-2FD4A02FD626}" destId="{CCB92EE8-4D92-4517-980A-59D31132CB69}" srcOrd="0" destOrd="0" presId="urn:microsoft.com/office/officeart/2005/8/layout/radial4"/>
+    <dgm:cxn modelId="{71E2C215-85D3-4141-870D-16D936156E01}" type="presParOf" srcId="{B66289B8-5DD2-4F87-AEB5-572BEEE6580F}" destId="{3809D590-D505-4609-9449-8C7CE26BBB73}" srcOrd="0" destOrd="0" presId="urn:microsoft.com/office/officeart/2005/8/layout/radial4"/>
+    <dgm:cxn modelId="{19355FB8-69D4-48E4-8915-F1FCECD673FB}" type="presParOf" srcId="{B66289B8-5DD2-4F87-AEB5-572BEEE6580F}" destId="{7DB67E7E-02A5-470D-B3C9-6D50F5061F50}" srcOrd="1" destOrd="0" presId="urn:microsoft.com/office/officeart/2005/8/layout/radial4"/>
+    <dgm:cxn modelId="{177D4FF6-988D-47EE-B868-0F447BA8044E}" type="presParOf" srcId="{B66289B8-5DD2-4F87-AEB5-572BEEE6580F}" destId="{475CE39B-1B99-4666-8EDA-F8CB494B907E}" srcOrd="2" destOrd="0" presId="urn:microsoft.com/office/officeart/2005/8/layout/radial4"/>
+    <dgm:cxn modelId="{0B460095-18DA-4DA7-868E-8BF97BD2EA73}" type="presParOf" srcId="{B66289B8-5DD2-4F87-AEB5-572BEEE6580F}" destId="{E7B6E3C1-9173-4B48-9836-966CDCBB5D3D}" srcOrd="3" destOrd="0" presId="urn:microsoft.com/office/officeart/2005/8/layout/radial4"/>
+    <dgm:cxn modelId="{3E6B5374-FFF9-4F37-8C28-4CF632CAE6DD}" type="presParOf" srcId="{B66289B8-5DD2-4F87-AEB5-572BEEE6580F}" destId="{FB8BD749-76FC-4B88-BA7B-8ACF9A8A8328}" srcOrd="4" destOrd="0" presId="urn:microsoft.com/office/officeart/2005/8/layout/radial4"/>
+    <dgm:cxn modelId="{FCA7C137-49B0-4AF0-8E2B-1B5CA8645A4C}" type="presParOf" srcId="{B66289B8-5DD2-4F87-AEB5-572BEEE6580F}" destId="{03919DC9-F0C3-4069-85B9-CC4858C63CBF}" srcOrd="5" destOrd="0" presId="urn:microsoft.com/office/officeart/2005/8/layout/radial4"/>
+    <dgm:cxn modelId="{1B05098B-24A1-40C5-B69D-929C64AD1015}" type="presParOf" srcId="{B66289B8-5DD2-4F87-AEB5-572BEEE6580F}" destId="{D4C39038-227F-471A-BACA-6905B12B6FE8}" srcOrd="6" destOrd="0" presId="urn:microsoft.com/office/officeart/2005/8/layout/radial4"/>
+    <dgm:cxn modelId="{EBA2278F-4DB3-406B-8506-37655B6A1D88}" type="presParOf" srcId="{B66289B8-5DD2-4F87-AEB5-572BEEE6580F}" destId="{8D8ECBD2-0A32-4224-A57A-330F54581E97}" srcOrd="7" destOrd="0" presId="urn:microsoft.com/office/officeart/2005/8/layout/radial4"/>
+    <dgm:cxn modelId="{01961CB5-80E2-4D1B-9B55-52E29667DDC4}" type="presParOf" srcId="{B66289B8-5DD2-4F87-AEB5-572BEEE6580F}" destId="{2436356F-AAE9-4DEE-876B-C3572B7F1160}" srcOrd="8" destOrd="0" presId="urn:microsoft.com/office/officeart/2005/8/layout/radial4"/>
+    <dgm:cxn modelId="{785080D5-41C3-45F1-AE35-762D98952235}" type="presParOf" srcId="{B66289B8-5DD2-4F87-AEB5-572BEEE6580F}" destId="{CCB92EE8-4D92-4517-980A-59D31132CB69}" srcOrd="9" destOrd="0" presId="urn:microsoft.com/office/officeart/2005/8/layout/radial4"/>
+    <dgm:cxn modelId="{529564BA-0275-48F7-B26B-EA8088F15BF5}" type="presParOf" srcId="{B66289B8-5DD2-4F87-AEB5-572BEEE6580F}" destId="{B53A010F-0ACE-4722-BD08-564C2143C5D3}" srcOrd="10" destOrd="0" presId="urn:microsoft.com/office/officeart/2005/8/layout/radial4"/>
   </dgm:cxnLst>
   <dgm:bg/>
   <dgm:whole/>
   <dgm:extLst>
     <a:ext uri="http://schemas.microsoft.com/office/drawing/2008/diagram">
-      <dsp:dataModelExt xmlns:dsp="http://schemas.microsoft.com/office/drawing/2008/diagram" relId="rId7" minVer="http://schemas.openxmlformats.org/drawingml/2006/diagram"/>
+      <dsp:dataModelExt xmlns:dsp="http://schemas.microsoft.com/office/drawing/2008/diagram" relId="rId14" minVer="http://schemas.openxmlformats.org/drawingml/2006/diagram"/>
     </a:ext>
   </dgm:extLst>
 </dgm:dataModel>
@@ -3246,8 +3302,8 @@
       </dsp:nvSpPr>
       <dsp:spPr>
         <a:xfrm>
-          <a:off x="2962507" y="2900037"/>
-          <a:ext cx="2053124" cy="2053124"/>
+          <a:off x="2220014" y="2213934"/>
+          <a:ext cx="1538549" cy="1538549"/>
         </a:xfrm>
         <a:prstGeom prst="ellipse">
           <a:avLst/>
@@ -3321,12 +3377,12 @@
         </a:fontRef>
       </dsp:style>
       <dsp:txBody>
-        <a:bodyPr spcFirstLastPara="0" vert="horz" wrap="square" lIns="20320" tIns="20320" rIns="20320" bIns="20320" numCol="1" spcCol="1270" anchor="ctr" anchorCtr="0">
+        <a:bodyPr spcFirstLastPara="0" vert="horz" wrap="square" lIns="15240" tIns="15240" rIns="15240" bIns="15240" numCol="1" spcCol="1270" anchor="ctr" anchorCtr="0">
           <a:noAutofit/>
         </a:bodyPr>
         <a:lstStyle/>
         <a:p>
-          <a:pPr lvl="0" algn="ctr" defTabSz="1422400">
+          <a:pPr lvl="0" algn="ctr" defTabSz="1066800">
             <a:lnSpc>
               <a:spcPct val="90000"/>
             </a:lnSpc>
@@ -3338,15 +3394,15 @@
             </a:spcAft>
           </a:pPr>
           <a:r>
-            <a:rPr lang="en-US" sz="3200" kern="1200" dirty="0" smtClean="0"/>
+            <a:rPr lang="en-US" sz="2400" kern="1200" dirty="0" smtClean="0"/>
             <a:t>Improve Study</a:t>
           </a:r>
-          <a:endParaRPr lang="en-US" sz="3200" kern="1200" dirty="0"/>
+          <a:endParaRPr lang="en-US" sz="2400" kern="1200" dirty="0"/>
         </a:p>
       </dsp:txBody>
       <dsp:txXfrm>
-        <a:off x="3263180" y="3200710"/>
-        <a:ext cx="1451778" cy="1451778"/>
+        <a:off x="2445329" y="2439249"/>
+        <a:ext cx="1087919" cy="1087919"/>
       </dsp:txXfrm>
     </dsp:sp>
     <dsp:sp modelId="{7DB67E7E-02A5-470D-B3C9-6D50F5061F50}">
@@ -3356,8 +3412,8 @@
       </dsp:nvSpPr>
       <dsp:spPr>
         <a:xfrm rot="10800000">
-          <a:off x="975844" y="3634029"/>
-          <a:ext cx="1877396" cy="585140"/>
+          <a:off x="731268" y="2763965"/>
+          <a:ext cx="1406864" cy="438486"/>
         </a:xfrm>
         <a:prstGeom prst="leftArrow">
           <a:avLst>
@@ -3441,8 +3497,8 @@
       </dsp:nvSpPr>
       <dsp:spPr>
         <a:xfrm>
-          <a:off x="610" y="3146412"/>
-          <a:ext cx="1950468" cy="1560374"/>
+          <a:off x="457" y="2398560"/>
+          <a:ext cx="1461622" cy="1169297"/>
         </a:xfrm>
         <a:prstGeom prst="roundRect">
           <a:avLst>
@@ -3518,12 +3574,12 @@
         </a:fontRef>
       </dsp:style>
       <dsp:txBody>
-        <a:bodyPr spcFirstLastPara="0" vert="horz" wrap="square" lIns="45720" tIns="45720" rIns="45720" bIns="45720" numCol="1" spcCol="1270" anchor="ctr" anchorCtr="0">
+        <a:bodyPr spcFirstLastPara="0" vert="horz" wrap="square" lIns="34290" tIns="34290" rIns="34290" bIns="34290" numCol="1" spcCol="1270" anchor="ctr" anchorCtr="0">
           <a:noAutofit/>
         </a:bodyPr>
         <a:lstStyle/>
         <a:p>
-          <a:pPr lvl="0" algn="ctr" defTabSz="1066800">
+          <a:pPr lvl="0" algn="ctr" defTabSz="800100">
             <a:lnSpc>
               <a:spcPct val="90000"/>
             </a:lnSpc>
@@ -3535,15 +3591,15 @@
             </a:spcAft>
           </a:pPr>
           <a:r>
-            <a:rPr lang="en-US" sz="2400" kern="1200" dirty="0" smtClean="0"/>
+            <a:rPr lang="en-US" sz="1800" kern="1200" dirty="0" smtClean="0"/>
             <a:t>Data Issues</a:t>
           </a:r>
-          <a:endParaRPr lang="en-US" sz="2400" kern="1200" dirty="0"/>
+          <a:endParaRPr lang="en-US" sz="1800" kern="1200" dirty="0"/>
         </a:p>
       </dsp:txBody>
       <dsp:txXfrm>
-        <a:off x="46312" y="3192114"/>
-        <a:ext cx="1859064" cy="1468970"/>
+        <a:off x="34705" y="2432808"/>
+        <a:ext cx="1393126" cy="1100801"/>
       </dsp:txXfrm>
     </dsp:sp>
     <dsp:sp modelId="{E7B6E3C1-9173-4B48-9836-966CDCBB5D3D}">
@@ -3553,8 +3609,8 @@
       </dsp:nvSpPr>
       <dsp:spPr>
         <a:xfrm rot="13500000">
-          <a:off x="1583459" y="2167117"/>
-          <a:ext cx="1877396" cy="585140"/>
+          <a:off x="1186597" y="1664706"/>
+          <a:ext cx="1406864" cy="438486"/>
         </a:xfrm>
         <a:prstGeom prst="leftArrow">
           <a:avLst>
@@ -3638,8 +3694,8 @@
       </dsp:nvSpPr>
       <dsp:spPr>
         <a:xfrm>
-          <a:off x="883163" y="1015740"/>
-          <a:ext cx="1950468" cy="1560374"/>
+          <a:off x="661816" y="801898"/>
+          <a:ext cx="1461622" cy="1169297"/>
         </a:xfrm>
         <a:prstGeom prst="roundRect">
           <a:avLst>
@@ -3715,12 +3771,12 @@
         </a:fontRef>
       </dsp:style>
       <dsp:txBody>
-        <a:bodyPr spcFirstLastPara="0" vert="horz" wrap="square" lIns="45720" tIns="45720" rIns="45720" bIns="45720" numCol="1" spcCol="1270" anchor="ctr" anchorCtr="0">
+        <a:bodyPr spcFirstLastPara="0" vert="horz" wrap="square" lIns="34290" tIns="34290" rIns="34290" bIns="34290" numCol="1" spcCol="1270" anchor="ctr" anchorCtr="0">
           <a:noAutofit/>
         </a:bodyPr>
         <a:lstStyle/>
         <a:p>
-          <a:pPr lvl="0" algn="ctr" defTabSz="1066800">
+          <a:pPr lvl="0" algn="ctr" defTabSz="800100">
             <a:lnSpc>
               <a:spcPct val="90000"/>
             </a:lnSpc>
@@ -3732,26 +3788,26 @@
             </a:spcAft>
           </a:pPr>
           <a:r>
-            <a:rPr lang="en-US" sz="2400" kern="1200" dirty="0" smtClean="0"/>
+            <a:rPr lang="en-US" sz="1800" kern="1200" dirty="0" smtClean="0"/>
             <a:t>Regression model fit with conceptual framework </a:t>
           </a:r>
-          <a:endParaRPr lang="en-US" sz="2400" kern="1200" dirty="0"/>
+          <a:endParaRPr lang="en-US" sz="1800" kern="1200" dirty="0"/>
         </a:p>
       </dsp:txBody>
       <dsp:txXfrm>
-        <a:off x="928865" y="1061442"/>
-        <a:ext cx="1859064" cy="1468970"/>
+        <a:off x="696064" y="836146"/>
+        <a:ext cx="1393126" cy="1100801"/>
       </dsp:txXfrm>
     </dsp:sp>
-    <dsp:sp modelId="{8D8ECBD2-0A32-4224-A57A-330F54581E97}">
+    <dsp:sp modelId="{03919DC9-F0C3-4069-85B9-CC4858C63CBF}">
       <dsp:nvSpPr>
         <dsp:cNvPr id="0" name=""/>
         <dsp:cNvSpPr/>
       </dsp:nvSpPr>
       <dsp:spPr>
         <a:xfrm rot="16200000">
-          <a:off x="3050371" y="1559502"/>
-          <a:ext cx="1877396" cy="585140"/>
+          <a:off x="2285857" y="1209377"/>
+          <a:ext cx="1406864" cy="438486"/>
         </a:xfrm>
         <a:prstGeom prst="leftArrow">
           <a:avLst>
@@ -3828,15 +3884,15 @@
         </a:fontRef>
       </dsp:style>
     </dsp:sp>
-    <dsp:sp modelId="{2436356F-AAE9-4DEE-876B-C3572B7F1160}">
+    <dsp:sp modelId="{D4C39038-227F-471A-BACA-6905B12B6FE8}">
       <dsp:nvSpPr>
         <dsp:cNvPr id="0" name=""/>
         <dsp:cNvSpPr/>
       </dsp:nvSpPr>
       <dsp:spPr>
         <a:xfrm>
-          <a:off x="3013835" y="133187"/>
-          <a:ext cx="1950468" cy="1560374"/>
+          <a:off x="2258478" y="140539"/>
+          <a:ext cx="1461622" cy="1169297"/>
         </a:xfrm>
         <a:prstGeom prst="roundRect">
           <a:avLst>
@@ -3912,12 +3968,12 @@
         </a:fontRef>
       </dsp:style>
       <dsp:txBody>
-        <a:bodyPr spcFirstLastPara="0" vert="horz" wrap="square" lIns="45720" tIns="45720" rIns="45720" bIns="45720" numCol="1" spcCol="1270" anchor="ctr" anchorCtr="0">
+        <a:bodyPr spcFirstLastPara="0" vert="horz" wrap="square" lIns="34290" tIns="34290" rIns="34290" bIns="34290" numCol="1" spcCol="1270" anchor="ctr" anchorCtr="0">
           <a:noAutofit/>
         </a:bodyPr>
         <a:lstStyle/>
         <a:p>
-          <a:pPr lvl="0" algn="ctr" defTabSz="1066800">
+          <a:pPr lvl="0" algn="ctr" defTabSz="800100">
             <a:lnSpc>
               <a:spcPct val="90000"/>
             </a:lnSpc>
@@ -3929,26 +3985,26 @@
             </a:spcAft>
           </a:pPr>
           <a:r>
-            <a:rPr lang="en-US" sz="2400" kern="1200" dirty="0" smtClean="0"/>
-            <a:t>Type of Analysis</a:t>
+            <a:rPr lang="en-US" sz="1800" kern="1200" dirty="0" smtClean="0"/>
+            <a:t>Study Variables</a:t>
           </a:r>
-          <a:endParaRPr lang="en-US" sz="2400" kern="1200" dirty="0"/>
+          <a:endParaRPr lang="en-US" sz="1800" kern="1200" dirty="0"/>
         </a:p>
       </dsp:txBody>
       <dsp:txXfrm>
-        <a:off x="3059537" y="178889"/>
-        <a:ext cx="1859064" cy="1468970"/>
+        <a:off x="2292726" y="174787"/>
+        <a:ext cx="1393126" cy="1100801"/>
       </dsp:txXfrm>
     </dsp:sp>
-    <dsp:sp modelId="{03919DC9-F0C3-4069-85B9-CC4858C63CBF}">
+    <dsp:sp modelId="{8D8ECBD2-0A32-4224-A57A-330F54581E97}">
       <dsp:nvSpPr>
         <dsp:cNvPr id="0" name=""/>
         <dsp:cNvSpPr/>
       </dsp:nvSpPr>
       <dsp:spPr>
         <a:xfrm rot="18900000">
-          <a:off x="4517283" y="2167117"/>
-          <a:ext cx="1877396" cy="585140"/>
+          <a:off x="3385117" y="1664706"/>
+          <a:ext cx="1406864" cy="438486"/>
         </a:xfrm>
         <a:prstGeom prst="leftArrow">
           <a:avLst>
@@ -4025,15 +4081,15 @@
         </a:fontRef>
       </dsp:style>
     </dsp:sp>
-    <dsp:sp modelId="{D4C39038-227F-471A-BACA-6905B12B6FE8}">
+    <dsp:sp modelId="{2436356F-AAE9-4DEE-876B-C3572B7F1160}">
       <dsp:nvSpPr>
         <dsp:cNvPr id="0" name=""/>
         <dsp:cNvSpPr/>
       </dsp:nvSpPr>
       <dsp:spPr>
         <a:xfrm>
-          <a:off x="5144507" y="1015740"/>
-          <a:ext cx="1950468" cy="1560374"/>
+          <a:off x="3855139" y="801898"/>
+          <a:ext cx="1461622" cy="1169297"/>
         </a:xfrm>
         <a:prstGeom prst="roundRect">
           <a:avLst>
@@ -4109,12 +4165,12 @@
         </a:fontRef>
       </dsp:style>
       <dsp:txBody>
-        <a:bodyPr spcFirstLastPara="0" vert="horz" wrap="square" lIns="45720" tIns="45720" rIns="45720" bIns="45720" numCol="1" spcCol="1270" anchor="ctr" anchorCtr="0">
+        <a:bodyPr spcFirstLastPara="0" vert="horz" wrap="square" lIns="34290" tIns="34290" rIns="34290" bIns="34290" numCol="1" spcCol="1270" anchor="ctr" anchorCtr="0">
           <a:noAutofit/>
         </a:bodyPr>
         <a:lstStyle/>
         <a:p>
-          <a:pPr lvl="0" algn="ctr" defTabSz="1066800">
+          <a:pPr lvl="0" algn="ctr" defTabSz="800100">
             <a:lnSpc>
               <a:spcPct val="90000"/>
             </a:lnSpc>
@@ -4126,15 +4182,15 @@
             </a:spcAft>
           </a:pPr>
           <a:r>
-            <a:rPr lang="en-US" sz="2400" kern="1200" dirty="0" smtClean="0"/>
-            <a:t>Study Variables</a:t>
+            <a:rPr lang="en-US" sz="1800" kern="1200" dirty="0" smtClean="0"/>
+            <a:t>Type of Analysis</a:t>
           </a:r>
-          <a:endParaRPr lang="en-US" sz="2400" kern="1200" dirty="0"/>
+          <a:endParaRPr lang="en-US" sz="1800" kern="1200" dirty="0"/>
         </a:p>
       </dsp:txBody>
       <dsp:txXfrm>
-        <a:off x="5190209" y="1061442"/>
-        <a:ext cx="1859064" cy="1468970"/>
+        <a:off x="3889387" y="836146"/>
+        <a:ext cx="1393126" cy="1100801"/>
       </dsp:txXfrm>
     </dsp:sp>
     <dsp:sp modelId="{CCB92EE8-4D92-4517-980A-59D31132CB69}">
@@ -4144,8 +4200,8 @@
       </dsp:nvSpPr>
       <dsp:spPr>
         <a:xfrm>
-          <a:off x="5124898" y="3634029"/>
-          <a:ext cx="1877396" cy="585140"/>
+          <a:off x="3840445" y="2763965"/>
+          <a:ext cx="1406864" cy="438486"/>
         </a:xfrm>
         <a:prstGeom prst="leftArrow">
           <a:avLst>
@@ -4229,8 +4285,8 @@
       </dsp:nvSpPr>
       <dsp:spPr>
         <a:xfrm>
-          <a:off x="6027060" y="3146412"/>
-          <a:ext cx="1950468" cy="1560374"/>
+          <a:off x="4516498" y="2398560"/>
+          <a:ext cx="1461622" cy="1169297"/>
         </a:xfrm>
         <a:prstGeom prst="roundRect">
           <a:avLst>
@@ -4306,12 +4362,12 @@
         </a:fontRef>
       </dsp:style>
       <dsp:txBody>
-        <a:bodyPr spcFirstLastPara="0" vert="horz" wrap="square" lIns="45720" tIns="45720" rIns="45720" bIns="45720" numCol="1" spcCol="1270" anchor="ctr" anchorCtr="0">
+        <a:bodyPr spcFirstLastPara="0" vert="horz" wrap="square" lIns="34290" tIns="34290" rIns="34290" bIns="34290" numCol="1" spcCol="1270" anchor="ctr" anchorCtr="0">
           <a:noAutofit/>
         </a:bodyPr>
         <a:lstStyle/>
         <a:p>
-          <a:pPr lvl="0" algn="ctr" defTabSz="1066800">
+          <a:pPr lvl="0" algn="ctr" defTabSz="800100">
             <a:lnSpc>
               <a:spcPct val="90000"/>
             </a:lnSpc>
@@ -4323,15 +4379,15 @@
             </a:spcAft>
           </a:pPr>
           <a:r>
-            <a:rPr lang="en-US" sz="2400" kern="1200" dirty="0" smtClean="0"/>
+            <a:rPr lang="en-US" sz="1800" kern="1200" dirty="0" smtClean="0"/>
             <a:t>Interpretation of Results</a:t>
           </a:r>
-          <a:endParaRPr lang="en-US" sz="2400" kern="1200" dirty="0"/>
+          <a:endParaRPr lang="en-US" sz="1800" kern="1200" dirty="0"/>
         </a:p>
       </dsp:txBody>
       <dsp:txXfrm>
-        <a:off x="6072762" y="3192114"/>
-        <a:ext cx="1859064" cy="1468970"/>
+        <a:off x="4550746" y="2432808"/>
+        <a:ext cx="1393126" cy="1100801"/>
       </dsp:txXfrm>
     </dsp:sp>
   </dsp:spTree>
@@ -7226,7 +7282,7 @@
           <a:p>
             <a:fld id="{235D0C9C-FE04-4D2F-A570-BCEF9F25AF09}" type="datetimeFigureOut">
               <a:rPr lang="en-US" smtClean="0"/>
-              <a:t>10/05/2018</a:t>
+              <a:t>10/7/2018</a:t>
             </a:fld>
             <a:endParaRPr lang="en-US"/>
           </a:p>
@@ -8897,7 +8953,7 @@
           <a:p>
             <a:fld id="{B2FFD341-8149-4AD4-87F3-AEC054F0F59C}" type="datetime1">
               <a:rPr lang="en-US" smtClean="0"/>
-              <a:t>10/05/2018</a:t>
+              <a:t>10/7/2018</a:t>
             </a:fld>
             <a:endParaRPr lang="en-US"/>
           </a:p>
@@ -9067,7 +9123,7 @@
           <a:p>
             <a:fld id="{35BF5644-C4CF-4457-B8F6-80F8DE2B3631}" type="datetime1">
               <a:rPr lang="en-US" smtClean="0"/>
-              <a:t>10/05/2018</a:t>
+              <a:t>10/7/2018</a:t>
             </a:fld>
             <a:endParaRPr lang="en-US"/>
           </a:p>
@@ -9247,7 +9303,7 @@
           <a:p>
             <a:fld id="{C5F5701A-7247-4BB3-9857-4874B0EE95CC}" type="datetime1">
               <a:rPr lang="en-US" smtClean="0"/>
-              <a:t>10/05/2018</a:t>
+              <a:t>10/7/2018</a:t>
             </a:fld>
             <a:endParaRPr lang="en-US"/>
           </a:p>
@@ -9417,7 +9473,7 @@
           <a:p>
             <a:fld id="{E0C6374D-BF12-4096-87A0-807717C03C3A}" type="datetime1">
               <a:rPr lang="en-US" smtClean="0"/>
-              <a:t>10/05/2018</a:t>
+              <a:t>10/7/2018</a:t>
             </a:fld>
             <a:endParaRPr lang="en-US"/>
           </a:p>
@@ -9663,7 +9719,7 @@
           <a:p>
             <a:fld id="{10EE01A5-6BAC-4216-A3C1-D43C9A2EC80E}" type="datetime1">
               <a:rPr lang="en-US" smtClean="0"/>
-              <a:t>10/05/2018</a:t>
+              <a:t>10/7/2018</a:t>
             </a:fld>
             <a:endParaRPr lang="en-US"/>
           </a:p>
@@ -9951,7 +10007,7 @@
           <a:p>
             <a:fld id="{8AA9849E-5DEC-4E07-BF18-7D0B479A97D2}" type="datetime1">
               <a:rPr lang="en-US" smtClean="0"/>
-              <a:t>10/05/2018</a:t>
+              <a:t>10/7/2018</a:t>
             </a:fld>
             <a:endParaRPr lang="en-US"/>
           </a:p>
@@ -10373,7 +10429,7 @@
           <a:p>
             <a:fld id="{F79C108E-7010-4C3B-BA6A-9614441F7151}" type="datetime1">
               <a:rPr lang="en-US" smtClean="0"/>
-              <a:t>10/05/2018</a:t>
+              <a:t>10/7/2018</a:t>
             </a:fld>
             <a:endParaRPr lang="en-US"/>
           </a:p>
@@ -10491,7 +10547,7 @@
           <a:p>
             <a:fld id="{13DC3AC4-8878-407A-B790-4FCD41475D37}" type="datetime1">
               <a:rPr lang="en-US" smtClean="0"/>
-              <a:t>10/05/2018</a:t>
+              <a:t>10/7/2018</a:t>
             </a:fld>
             <a:endParaRPr lang="en-US"/>
           </a:p>
@@ -10586,7 +10642,7 @@
           <a:p>
             <a:fld id="{554E297D-E0E0-4553-AEAE-30AFEB1DD1B5}" type="datetime1">
               <a:rPr lang="en-US" smtClean="0"/>
-              <a:t>10/05/2018</a:t>
+              <a:t>10/7/2018</a:t>
             </a:fld>
             <a:endParaRPr lang="en-US"/>
           </a:p>
@@ -10863,7 +10919,7 @@
           <a:p>
             <a:fld id="{BD274C2E-B22F-43F1-9703-96990825B5DD}" type="datetime1">
               <a:rPr lang="en-US" smtClean="0"/>
-              <a:t>10/05/2018</a:t>
+              <a:t>10/7/2018</a:t>
             </a:fld>
             <a:endParaRPr lang="en-US"/>
           </a:p>
@@ -11116,7 +11172,7 @@
           <a:p>
             <a:fld id="{20B8AA96-18A4-42B8-BE13-E473D0F459F8}" type="datetime1">
               <a:rPr lang="en-US" smtClean="0"/>
-              <a:t>10/05/2018</a:t>
+              <a:t>10/7/2018</a:t>
             </a:fld>
             <a:endParaRPr lang="en-US"/>
           </a:p>
@@ -11329,7 +11385,7 @@
           <a:p>
             <a:fld id="{40DA1FD4-43F9-4E19-B925-BCCD6E240E7E}" type="datetime1">
               <a:rPr lang="en-US" smtClean="0"/>
-              <a:t>10/05/2018</a:t>
+              <a:t>10/7/2018</a:t>
             </a:fld>
             <a:endParaRPr lang="en-US"/>
           </a:p>
@@ -11853,6 +11909,13 @@
   <p:clrMapOvr>
     <a:masterClrMapping/>
   </p:clrMapOvr>
+  <p:timing>
+    <p:tnLst>
+      <p:par>
+        <p:cTn id="1" dur="indefinite" restart="never" nodeType="tmRoot"/>
+      </p:par>
+    </p:tnLst>
+  </p:timing>
 </p:sld>
 </file>
 
@@ -11972,15 +12035,7 @@
           <a:p>
             <a:r>
               <a:rPr lang="en-US" dirty="0" smtClean="0"/>
-              <a:t>Table 1 on</a:t>
-            </a:r>
-            <a:r>
-              <a:rPr lang="en-US" dirty="0" smtClean="0"/>
-              <a:t> </a:t>
-            </a:r>
-            <a:r>
-              <a:rPr lang="en-US" dirty="0" smtClean="0"/>
-              <a:t>p. 638</a:t>
+              <a:t>Table 1 on p. 638</a:t>
             </a:r>
             <a:endParaRPr lang="en-US" dirty="0"/>
           </a:p>
@@ -14065,6 +14120,13 @@
   <p:clrMapOvr>
     <a:masterClrMapping/>
   </p:clrMapOvr>
+  <p:timing>
+    <p:tnLst>
+      <p:par>
+        <p:cTn id="1" dur="indefinite" restart="never" nodeType="tmRoot"/>
+      </p:par>
+    </p:tnLst>
+  </p:timing>
 </p:sld>
 </file>
 
@@ -14108,7 +14170,7 @@
         </p:blipFill>
         <p:spPr bwMode="auto">
           <a:xfrm>
-            <a:off x="2057400" y="893394"/>
+            <a:off x="9286503" y="798388"/>
             <a:ext cx="5029200" cy="3928213"/>
           </a:xfrm>
           <a:prstGeom prst="rect">
@@ -14170,7 +14232,7 @@
         </p:nvSpPr>
         <p:spPr>
           <a:xfrm>
-            <a:off x="2057400" y="5006340"/>
+            <a:off x="1326535" y="5336174"/>
             <a:ext cx="1977390" cy="369332"/>
           </a:xfrm>
           <a:prstGeom prst="rect">
@@ -14186,20 +14248,76 @@
           <a:p>
             <a:r>
               <a:rPr lang="en-US" dirty="0" smtClean="0"/>
-              <a:t>Table 2 on</a:t>
-            </a:r>
-            <a:r>
-              <a:rPr lang="en-US" dirty="0" smtClean="0"/>
-              <a:t> </a:t>
-            </a:r>
-            <a:r>
-              <a:rPr lang="en-US" dirty="0" smtClean="0"/>
-              <a:t>p. 639</a:t>
+              <a:t>Table 2 on p. 639</a:t>
             </a:r>
             <a:endParaRPr lang="en-US" dirty="0"/>
           </a:p>
         </p:txBody>
       </p:sp>
+      <p:pic>
+        <p:nvPicPr>
+          <p:cNvPr id="1026" name="Picture 2"/>
+          <p:cNvPicPr>
+            <a:picLocks noChangeAspect="1" noChangeArrowheads="1"/>
+          </p:cNvPicPr>
+          <p:nvPr/>
+        </p:nvPicPr>
+        <p:blipFill>
+          <a:blip r:embed="rId4">
+            <a:extLst>
+              <a:ext uri="{28A0092B-C50C-407E-A947-70E740481C1C}">
+                <a14:useLocalDpi xmlns:a14="http://schemas.microsoft.com/office/drawing/2010/main" val="0"/>
+              </a:ext>
+            </a:extLst>
+          </a:blip>
+          <a:srcRect/>
+          <a:stretch>
+            <a:fillRect/>
+          </a:stretch>
+        </p:blipFill>
+        <p:spPr bwMode="auto">
+          <a:xfrm>
+            <a:off x="1326535" y="284702"/>
+            <a:ext cx="6400800" cy="4877463"/>
+          </a:xfrm>
+          <a:prstGeom prst="rect">
+            <a:avLst/>
+          </a:prstGeom>
+          <a:noFill/>
+          <a:ln>
+            <a:noFill/>
+          </a:ln>
+          <a:effectLst/>
+          <a:extLst>
+            <a:ext uri="{909E8E84-426E-40DD-AFC4-6F175D3DCCD1}">
+              <a14:hiddenFill xmlns:a14="http://schemas.microsoft.com/office/drawing/2010/main">
+                <a:solidFill>
+                  <a:schemeClr val="accent1"/>
+                </a:solidFill>
+              </a14:hiddenFill>
+            </a:ext>
+            <a:ext uri="{91240B29-F687-4F45-9708-019B960494DF}">
+              <a14:hiddenLine xmlns:a14="http://schemas.microsoft.com/office/drawing/2010/main" w="9525">
+                <a:solidFill>
+                  <a:schemeClr val="tx1"/>
+                </a:solidFill>
+                <a:miter lim="800000"/>
+                <a:headEnd/>
+                <a:tailEnd/>
+              </a14:hiddenLine>
+            </a:ext>
+            <a:ext uri="{AF507438-7753-43E0-B8FC-AC1667EBCBE1}">
+              <a14:hiddenEffects xmlns:a14="http://schemas.microsoft.com/office/drawing/2010/main">
+                <a:effectLst>
+                  <a:outerShdw dist="35921" dir="2700000" algn="ctr" rotWithShape="0">
+                    <a:schemeClr val="bg2"/>
+                  </a:outerShdw>
+                </a:effectLst>
+              </a14:hiddenEffects>
+            </a:ext>
+          </a:extLst>
+        </p:spPr>
+      </p:pic>
     </p:spTree>
     <p:extLst>
       <p:ext uri="{BB962C8B-B14F-4D97-AF65-F5344CB8AC3E}">
@@ -14512,6 +14630,13 @@
   <p:clrMapOvr>
     <a:masterClrMapping/>
   </p:clrMapOvr>
+  <p:timing>
+    <p:tnLst>
+      <p:par>
+        <p:cTn id="1" dur="indefinite" restart="never" nodeType="tmRoot"/>
+      </p:par>
+    </p:tnLst>
+  </p:timing>
 </p:sld>
 </file>
 
@@ -14829,6 +14954,13 @@
   <p:clrMapOvr>
     <a:masterClrMapping/>
   </p:clrMapOvr>
+  <p:timing>
+    <p:tnLst>
+      <p:par>
+        <p:cTn id="1" dur="indefinite" restart="never" nodeType="tmRoot"/>
+      </p:par>
+    </p:tnLst>
+  </p:timing>
 </p:sld>
 </file>
 
@@ -14986,7 +15118,15 @@
             <a:pPr lvl="1"/>
             <a:r>
               <a:rPr lang="en-US" dirty="0" smtClean="0"/>
-              <a:t>Compensation to departments positively associated with licensing revenue.</a:t>
+              <a:t>Compensation to </a:t>
+            </a:r>
+            <a:r>
+              <a:rPr lang="en-US" dirty="0" smtClean="0"/>
+              <a:t>inventors’ departments </a:t>
+            </a:r>
+            <a:r>
+              <a:rPr lang="en-US" dirty="0" smtClean="0"/>
+              <a:t>positively associated with licensing revenue.</a:t>
             </a:r>
             <a:endParaRPr lang="en-US" dirty="0"/>
           </a:p>
@@ -15120,6 +15260,13 @@
   <p:clrMapOvr>
     <a:masterClrMapping/>
   </p:clrMapOvr>
+  <p:timing>
+    <p:tnLst>
+      <p:par>
+        <p:cTn id="1" dur="indefinite" restart="never" nodeType="tmRoot"/>
+      </p:par>
+    </p:tnLst>
+  </p:timing>
 </p:sld>
 </file>
 
@@ -15140,6 +15287,332 @@
           <a:chExt cx="0" cy="0"/>
         </a:xfrm>
       </p:grpSpPr>
+      <p:pic>
+        <p:nvPicPr>
+          <p:cNvPr id="2055" name="Picture 7" descr="Image result for exponential data distribution"/>
+          <p:cNvPicPr>
+            <a:picLocks noChangeAspect="1" noChangeArrowheads="1"/>
+          </p:cNvPicPr>
+          <p:nvPr/>
+        </p:nvPicPr>
+        <p:blipFill>
+          <a:blip r:embed="rId3">
+            <a:extLst>
+              <a:ext uri="{28A0092B-C50C-407E-A947-70E740481C1C}">
+                <a14:useLocalDpi xmlns:a14="http://schemas.microsoft.com/office/drawing/2010/main" val="0"/>
+              </a:ext>
+            </a:extLst>
+          </a:blip>
+          <a:srcRect/>
+          <a:stretch>
+            <a:fillRect/>
+          </a:stretch>
+        </p:blipFill>
+        <p:spPr bwMode="auto">
+          <a:xfrm>
+            <a:off x="730293" y="2659313"/>
+            <a:ext cx="1371600" cy="1097281"/>
+          </a:xfrm>
+          <a:prstGeom prst="rect">
+            <a:avLst/>
+          </a:prstGeom>
+          <a:noFill/>
+          <a:extLst>
+            <a:ext uri="{909E8E84-426E-40DD-AFC4-6F175D3DCCD1}">
+              <a14:hiddenFill xmlns:a14="http://schemas.microsoft.com/office/drawing/2010/main">
+                <a:solidFill>
+                  <a:srgbClr val="FFFFFF"/>
+                </a:solidFill>
+              </a14:hiddenFill>
+            </a:ext>
+          </a:extLst>
+        </p:spPr>
+      </p:pic>
+      <p:pic>
+        <p:nvPicPr>
+          <p:cNvPr id="2050" name="Picture 2" descr="C:\Users\MTownes\Pictures\00_Miscellaneous\Picture1.png"/>
+          <p:cNvPicPr>
+            <a:picLocks noChangeAspect="1" noChangeArrowheads="1"/>
+          </p:cNvPicPr>
+          <p:nvPr/>
+        </p:nvPicPr>
+        <p:blipFill>
+          <a:blip r:embed="rId4" cstate="print">
+            <a:extLst>
+              <a:ext uri="{28A0092B-C50C-407E-A947-70E740481C1C}">
+                <a14:useLocalDpi xmlns:a14="http://schemas.microsoft.com/office/drawing/2010/main" val="0"/>
+              </a:ext>
+            </a:extLst>
+          </a:blip>
+          <a:srcRect/>
+          <a:stretch>
+            <a:fillRect/>
+          </a:stretch>
+        </p:blipFill>
+        <p:spPr bwMode="auto">
+          <a:xfrm>
+            <a:off x="5984543" y="332411"/>
+            <a:ext cx="2286000" cy="1905000"/>
+          </a:xfrm>
+          <a:prstGeom prst="rect">
+            <a:avLst/>
+          </a:prstGeom>
+          <a:noFill/>
+          <a:extLst>
+            <a:ext uri="{909E8E84-426E-40DD-AFC4-6F175D3DCCD1}">
+              <a14:hiddenFill xmlns:a14="http://schemas.microsoft.com/office/drawing/2010/main">
+                <a:solidFill>
+                  <a:srgbClr val="FFFFFF"/>
+                </a:solidFill>
+              </a14:hiddenFill>
+            </a:ext>
+          </a:extLst>
+        </p:spPr>
+      </p:pic>
+      <p:pic>
+        <p:nvPicPr>
+          <p:cNvPr id="2053" name="Picture 5" descr="C:\Users\MTownes\AppData\Local\Temp\normal-both-tails-shaded-inside-twos.png"/>
+          <p:cNvPicPr>
+            <a:picLocks noChangeAspect="1" noChangeArrowheads="1"/>
+          </p:cNvPicPr>
+          <p:nvPr/>
+        </p:nvPicPr>
+        <p:blipFill>
+          <a:blip r:embed="rId5" cstate="print">
+            <a:extLst>
+              <a:ext uri="{28A0092B-C50C-407E-A947-70E740481C1C}">
+                <a14:useLocalDpi xmlns:a14="http://schemas.microsoft.com/office/drawing/2010/main" val="0"/>
+              </a:ext>
+            </a:extLst>
+          </a:blip>
+          <a:srcRect/>
+          <a:stretch>
+            <a:fillRect/>
+          </a:stretch>
+        </p:blipFill>
+        <p:spPr bwMode="auto">
+          <a:xfrm>
+            <a:off x="-184107" y="3388011"/>
+            <a:ext cx="1828800" cy="966970"/>
+          </a:xfrm>
+          <a:prstGeom prst="rect">
+            <a:avLst/>
+          </a:prstGeom>
+          <a:noFill/>
+          <a:extLst>
+            <a:ext uri="{909E8E84-426E-40DD-AFC4-6F175D3DCCD1}">
+              <a14:hiddenFill xmlns:a14="http://schemas.microsoft.com/office/drawing/2010/main">
+                <a:solidFill>
+                  <a:srgbClr val="FFFFFF"/>
+                </a:solidFill>
+              </a14:hiddenFill>
+            </a:ext>
+          </a:extLst>
+        </p:spPr>
+      </p:pic>
+      <p:pic>
+        <p:nvPicPr>
+          <p:cNvPr id="8" name="Picture 2"/>
+          <p:cNvPicPr>
+            <a:picLocks noChangeAspect="1" noChangeArrowheads="1"/>
+          </p:cNvPicPr>
+          <p:nvPr/>
+        </p:nvPicPr>
+        <p:blipFill rotWithShape="1">
+          <a:blip r:embed="rId6">
+            <a:extLst>
+              <a:ext uri="{28A0092B-C50C-407E-A947-70E740481C1C}">
+                <a14:useLocalDpi xmlns:a14="http://schemas.microsoft.com/office/drawing/2010/main" val="0"/>
+              </a:ext>
+            </a:extLst>
+          </a:blip>
+          <a:srcRect l="23587" t="7083" r="24642" b="7918"/>
+          <a:stretch/>
+        </p:blipFill>
+        <p:spPr bwMode="auto">
+          <a:xfrm rot="5400000">
+            <a:off x="1198272" y="3587789"/>
+            <a:ext cx="1097280" cy="2592798"/>
+          </a:xfrm>
+          <a:prstGeom prst="rect">
+            <a:avLst/>
+          </a:prstGeom>
+          <a:noFill/>
+          <a:ln>
+            <a:noFill/>
+          </a:ln>
+          <a:extLst>
+            <a:ext uri="{909E8E84-426E-40DD-AFC4-6F175D3DCCD1}">
+              <a14:hiddenFill xmlns:a14="http://schemas.microsoft.com/office/drawing/2010/main">
+                <a:solidFill>
+                  <a:schemeClr val="accent1"/>
+                </a:solidFill>
+              </a14:hiddenFill>
+            </a:ext>
+            <a:ext uri="{91240B29-F687-4F45-9708-019B960494DF}">
+              <a14:hiddenLine xmlns:a14="http://schemas.microsoft.com/office/drawing/2010/main" w="9525">
+                <a:solidFill>
+                  <a:schemeClr val="tx1"/>
+                </a:solidFill>
+                <a:miter lim="800000"/>
+                <a:headEnd/>
+                <a:tailEnd/>
+              </a14:hiddenLine>
+            </a:ext>
+          </a:extLst>
+        </p:spPr>
+      </p:pic>
+      <p:pic>
+        <p:nvPicPr>
+          <p:cNvPr id="4" name="Picture 2" descr="1 main">
+            <a:extLst>
+              <a:ext uri="{FF2B5EF4-FFF2-40B4-BE49-F238E27FC236}">
+                <a16:creationId xmlns:a16="http://schemas.microsoft.com/office/drawing/2014/main" xmlns="" id="{5A709434-9A6A-4E34-979D-47DDC3059BA8}"/>
+              </a:ext>
+            </a:extLst>
+          </p:cNvPr>
+          <p:cNvPicPr>
+            <a:picLocks noChangeAspect="1" noChangeArrowheads="1"/>
+          </p:cNvPicPr>
+          <p:nvPr/>
+        </p:nvPicPr>
+        <p:blipFill>
+          <a:blip r:embed="rId7">
+            <a:extLst>
+              <a:ext uri="{28A0092B-C50C-407E-A947-70E740481C1C}">
+                <a14:useLocalDpi xmlns:a14="http://schemas.microsoft.com/office/drawing/2010/main" val="0"/>
+              </a:ext>
+            </a:extLst>
+          </a:blip>
+          <a:stretch>
+            <a:fillRect/>
+          </a:stretch>
+        </p:blipFill>
+        <p:spPr bwMode="auto">
+          <a:xfrm>
+            <a:off x="7049072" y="2428485"/>
+            <a:ext cx="2011680" cy="1584957"/>
+          </a:xfrm>
+          <a:prstGeom prst="rect">
+            <a:avLst/>
+          </a:prstGeom>
+          <a:noFill/>
+          <a:extLst>
+            <a:ext uri="{909E8E84-426E-40DD-AFC4-6F175D3DCCD1}">
+              <a14:hiddenFill xmlns:a14="http://schemas.microsoft.com/office/drawing/2010/main">
+                <a:solidFill>
+                  <a:srgbClr val="FFFFFF"/>
+                </a:solidFill>
+              </a14:hiddenFill>
+            </a:ext>
+          </a:extLst>
+        </p:spPr>
+      </p:pic>
+      <p:pic>
+        <p:nvPicPr>
+          <p:cNvPr id="2052" name="Picture 4"/>
+          <p:cNvPicPr>
+            <a:picLocks noChangeAspect="1" noChangeArrowheads="1"/>
+          </p:cNvPicPr>
+          <p:nvPr/>
+        </p:nvPicPr>
+        <p:blipFill>
+          <a:blip r:embed="rId8" cstate="print">
+            <a:extLst>
+              <a:ext uri="{28A0092B-C50C-407E-A947-70E740481C1C}">
+                <a14:useLocalDpi xmlns:a14="http://schemas.microsoft.com/office/drawing/2010/main" val="0"/>
+              </a:ext>
+            </a:extLst>
+          </a:blip>
+          <a:srcRect/>
+          <a:stretch>
+            <a:fillRect/>
+          </a:stretch>
+        </p:blipFill>
+        <p:spPr bwMode="auto">
+          <a:xfrm>
+            <a:off x="777914" y="264171"/>
+            <a:ext cx="2743200" cy="1786201"/>
+          </a:xfrm>
+          <a:prstGeom prst="rect">
+            <a:avLst/>
+          </a:prstGeom>
+          <a:noFill/>
+          <a:ln>
+            <a:noFill/>
+          </a:ln>
+          <a:effectLst/>
+          <a:extLst>
+            <a:ext uri="{909E8E84-426E-40DD-AFC4-6F175D3DCCD1}">
+              <a14:hiddenFill xmlns:a14="http://schemas.microsoft.com/office/drawing/2010/main">
+                <a:solidFill>
+                  <a:schemeClr val="accent1"/>
+                </a:solidFill>
+              </a14:hiddenFill>
+            </a:ext>
+            <a:ext uri="{91240B29-F687-4F45-9708-019B960494DF}">
+              <a14:hiddenLine xmlns:a14="http://schemas.microsoft.com/office/drawing/2010/main" w="9525">
+                <a:solidFill>
+                  <a:schemeClr val="tx1"/>
+                </a:solidFill>
+                <a:miter lim="800000"/>
+                <a:headEnd/>
+                <a:tailEnd/>
+              </a14:hiddenLine>
+            </a:ext>
+            <a:ext uri="{AF507438-7753-43E0-B8FC-AC1667EBCBE1}">
+              <a14:hiddenEffects xmlns:a14="http://schemas.microsoft.com/office/drawing/2010/main">
+                <a:effectLst>
+                  <a:outerShdw dist="35921" dir="2700000" algn="ctr" rotWithShape="0">
+                    <a:schemeClr val="bg2"/>
+                  </a:outerShdw>
+                </a:effectLst>
+              </a14:hiddenEffects>
+            </a:ext>
+          </a:extLst>
+        </p:spPr>
+      </p:pic>
+      <p:pic>
+        <p:nvPicPr>
+          <p:cNvPr id="2051" name="Picture 3" descr="C:\Users\MTownes\AppData\Local\Temp\2018_calendar.png"/>
+          <p:cNvPicPr>
+            <a:picLocks noChangeAspect="1" noChangeArrowheads="1"/>
+          </p:cNvPicPr>
+          <p:nvPr/>
+        </p:nvPicPr>
+        <p:blipFill>
+          <a:blip r:embed="rId9" cstate="print">
+            <a:extLst>
+              <a:ext uri="{28A0092B-C50C-407E-A947-70E740481C1C}">
+                <a14:useLocalDpi xmlns:a14="http://schemas.microsoft.com/office/drawing/2010/main" val="0"/>
+              </a:ext>
+            </a:extLst>
+          </a:blip>
+          <a:srcRect/>
+          <a:stretch>
+            <a:fillRect/>
+          </a:stretch>
+        </p:blipFill>
+        <p:spPr bwMode="auto">
+          <a:xfrm>
+            <a:off x="4264924" y="213972"/>
+            <a:ext cx="1293878" cy="1828800"/>
+          </a:xfrm>
+          <a:prstGeom prst="rect">
+            <a:avLst/>
+          </a:prstGeom>
+          <a:noFill/>
+          <a:extLst>
+            <a:ext uri="{909E8E84-426E-40DD-AFC4-6F175D3DCCD1}">
+              <a14:hiddenFill xmlns:a14="http://schemas.microsoft.com/office/drawing/2010/main">
+                <a:solidFill>
+                  <a:srgbClr val="FFFFFF"/>
+                </a:solidFill>
+              </a14:hiddenFill>
+            </a:ext>
+          </a:extLst>
+        </p:spPr>
+      </p:pic>
       <p:sp>
         <p:nvSpPr>
           <p:cNvPr id="2" name="Slide Number Placeholder 1"/>
@@ -15170,18 +15643,18 @@
           <p:nvPr>
             <p:extLst>
               <p:ext uri="{D42A27DB-BD31-4B8C-83A1-F6EECF244321}">
-                <p14:modId xmlns:p14="http://schemas.microsoft.com/office/powerpoint/2010/main" val="325404312"/>
+                <p14:modId xmlns:p14="http://schemas.microsoft.com/office/powerpoint/2010/main" val="3922363564"/>
               </p:ext>
             </p:extLst>
           </p:nvPr>
         </p:nvGraphicFramePr>
         <p:xfrm>
-          <a:off x="667881" y="228600"/>
-          <a:ext cx="7978140" cy="5086350"/>
+          <a:off x="1582711" y="1331519"/>
+          <a:ext cx="5978579" cy="3893024"/>
         </p:xfrm>
         <a:graphic>
           <a:graphicData uri="http://schemas.openxmlformats.org/drawingml/2006/diagram">
-            <dgm:relIds xmlns:dgm="http://schemas.openxmlformats.org/drawingml/2006/diagram" xmlns:r="http://schemas.openxmlformats.org/officeDocument/2006/relationships" r:dm="rId3" r:lo="rId4" r:qs="rId5" r:cs="rId6"/>
+            <dgm:relIds xmlns:dgm="http://schemas.openxmlformats.org/drawingml/2006/diagram" xmlns:r="http://schemas.openxmlformats.org/officeDocument/2006/relationships" r:dm="rId10" r:lo="rId11" r:qs="rId12" r:cs="rId13"/>
           </a:graphicData>
         </a:graphic>
       </p:graphicFrame>
@@ -15195,6 +15668,13 @@
   <p:clrMapOvr>
     <a:masterClrMapping/>
   </p:clrMapOvr>
+  <p:timing>
+    <p:tnLst>
+      <p:par>
+        <p:cTn id="1" dur="indefinite" restart="never" nodeType="tmRoot"/>
+      </p:par>
+    </p:tnLst>
+  </p:timing>
 </p:sld>
 </file>
 
@@ -15401,6 +15881,13 @@
   <p:clrMapOvr>
     <a:masterClrMapping/>
   </p:clrMapOvr>
+  <p:timing>
+    <p:tnLst>
+      <p:par>
+        <p:cTn id="1" dur="indefinite" restart="never" nodeType="tmRoot"/>
+      </p:par>
+    </p:tnLst>
+  </p:timing>
 </p:sld>
 </file>
 
@@ -15735,6 +16222,13 @@
   <p:clrMapOvr>
     <a:masterClrMapping/>
   </p:clrMapOvr>
+  <p:timing>
+    <p:tnLst>
+      <p:par>
+        <p:cTn id="1" dur="indefinite" restart="never" nodeType="tmRoot"/>
+      </p:par>
+    </p:tnLst>
+  </p:timing>
 </p:sld>
 </file>
 
@@ -17609,6 +18103,13 @@
   <p:clrMapOvr>
     <a:masterClrMapping/>
   </p:clrMapOvr>
+  <p:timing>
+    <p:tnLst>
+      <p:par>
+        <p:cTn id="1" dur="indefinite" restart="never" nodeType="tmRoot"/>
+      </p:par>
+    </p:tnLst>
+  </p:timing>
 </p:sld>
 </file>
 
@@ -17932,6 +18433,13 @@
   <p:clrMapOvr>
     <a:masterClrMapping/>
   </p:clrMapOvr>
+  <p:timing>
+    <p:tnLst>
+      <p:par>
+        <p:cTn id="1" dur="indefinite" restart="never" nodeType="tmRoot"/>
+      </p:par>
+    </p:tnLst>
+  </p:timing>
 </p:sld>
 </file>
 
@@ -18501,6 +19009,13 @@
   <p:clrMapOvr>
     <a:masterClrMapping/>
   </p:clrMapOvr>
+  <p:timing>
+    <p:tnLst>
+      <p:par>
+        <p:cTn id="1" dur="indefinite" restart="never" nodeType="tmRoot"/>
+      </p:par>
+    </p:tnLst>
+  </p:timing>
 </p:sld>
 </file>
 
@@ -18681,6 +19196,13 @@
   <p:clrMapOvr>
     <a:masterClrMapping/>
   </p:clrMapOvr>
+  <p:timing>
+    <p:tnLst>
+      <p:par>
+        <p:cTn id="1" dur="indefinite" restart="never" nodeType="tmRoot"/>
+      </p:par>
+    </p:tnLst>
+  </p:timing>
 </p:sld>
 </file>
 
@@ -18786,6 +19308,13 @@
   <p:clrMapOvr>
     <a:masterClrMapping/>
   </p:clrMapOvr>
+  <p:timing>
+    <p:tnLst>
+      <p:par>
+        <p:cTn id="1" dur="indefinite" restart="never" nodeType="tmRoot"/>
+      </p:par>
+    </p:tnLst>
+  </p:timing>
 </p:sld>
 </file>
 

</xml_diff>